<commit_message>
starting to get into analysis
</commit_message>
<xml_diff>
--- a/image_grouping_final.pptx
+++ b/image_grouping_final.pptx
@@ -117,7 +117,6 @@
 <file path=ppt/revisionInfo.xml><?xml version="1.0" encoding="utf-8"?>
 <p1510:revInfo xmlns:a="http://schemas.openxmlformats.org/drawingml/2006/main" xmlns:r="http://schemas.openxmlformats.org/officeDocument/2006/relationships" xmlns:p1510="http://schemas.microsoft.com/office/powerpoint/2015/10/main">
   <p1510:revLst>
-    <p1510:client id="{6FE7FE2B-8845-412E-AF52-674750132EC5}" v="1" dt="2024-09-10T01:54:57.644"/>
     <p1510:client id="{BEC42C30-1405-4B48-B756-209F5AB0C858}" v="1" dt="2024-09-10T03:19:22.536"/>
   </p1510:revLst>
 </p1510:revInfo>
@@ -128,18 +127,18 @@
   <pc:docChgLst>
     <pc:chgData name="Chenyue Han" userId="494f182c-4a72-4c0d-80c8-f426388df5bd" providerId="ADAL" clId="{BEC42C30-1405-4B48-B756-209F5AB0C858}"/>
     <pc:docChg chg="undo custSel addSld modSld">
-      <pc:chgData name="Chenyue Han" userId="494f182c-4a72-4c0d-80c8-f426388df5bd" providerId="ADAL" clId="{BEC42C30-1405-4B48-B756-209F5AB0C858}" dt="2024-09-10T03:20:37.609" v="39" actId="20577"/>
+      <pc:chgData name="Chenyue Han" userId="494f182c-4a72-4c0d-80c8-f426388df5bd" providerId="ADAL" clId="{BEC42C30-1405-4B48-B756-209F5AB0C858}" dt="2024-09-14T01:43:24.483" v="96" actId="20577"/>
       <pc:docMkLst>
         <pc:docMk/>
       </pc:docMkLst>
       <pc:sldChg chg="modSp add mod">
-        <pc:chgData name="Chenyue Han" userId="494f182c-4a72-4c0d-80c8-f426388df5bd" providerId="ADAL" clId="{BEC42C30-1405-4B48-B756-209F5AB0C858}" dt="2024-09-10T03:20:37.609" v="39" actId="20577"/>
+        <pc:chgData name="Chenyue Han" userId="494f182c-4a72-4c0d-80c8-f426388df5bd" providerId="ADAL" clId="{BEC42C30-1405-4B48-B756-209F5AB0C858}" dt="2024-09-14T01:43:24.483" v="96" actId="20577"/>
         <pc:sldMkLst>
           <pc:docMk/>
           <pc:sldMk cId="4030571443" sldId="258"/>
         </pc:sldMkLst>
         <pc:spChg chg="mod">
-          <ac:chgData name="Chenyue Han" userId="494f182c-4a72-4c0d-80c8-f426388df5bd" providerId="ADAL" clId="{BEC42C30-1405-4B48-B756-209F5AB0C858}" dt="2024-09-10T03:20:03.830" v="32" actId="1076"/>
+          <ac:chgData name="Chenyue Han" userId="494f182c-4a72-4c0d-80c8-f426388df5bd" providerId="ADAL" clId="{BEC42C30-1405-4B48-B756-209F5AB0C858}" dt="2024-09-14T01:42:20.509" v="95" actId="207"/>
           <ac:spMkLst>
             <pc:docMk/>
             <pc:sldMk cId="4030571443" sldId="258"/>
@@ -251,7 +250,7 @@
           </ac:spMkLst>
         </pc:spChg>
         <pc:spChg chg="mod">
-          <ac:chgData name="Chenyue Han" userId="494f182c-4a72-4c0d-80c8-f426388df5bd" providerId="ADAL" clId="{BEC42C30-1405-4B48-B756-209F5AB0C858}" dt="2024-09-10T03:20:37.609" v="39" actId="20577"/>
+          <ac:chgData name="Chenyue Han" userId="494f182c-4a72-4c0d-80c8-f426388df5bd" providerId="ADAL" clId="{BEC42C30-1405-4B48-B756-209F5AB0C858}" dt="2024-09-14T01:43:24.483" v="96" actId="20577"/>
           <ac:spMkLst>
             <pc:docMk/>
             <pc:sldMk cId="4030571443" sldId="258"/>
@@ -259,7 +258,7 @@
           </ac:spMkLst>
         </pc:spChg>
         <pc:cxnChg chg="mod">
-          <ac:chgData name="Chenyue Han" userId="494f182c-4a72-4c0d-80c8-f426388df5bd" providerId="ADAL" clId="{BEC42C30-1405-4B48-B756-209F5AB0C858}" dt="2024-09-10T03:20:08.840" v="33" actId="1076"/>
+          <ac:chgData name="Chenyue Han" userId="494f182c-4a72-4c0d-80c8-f426388df5bd" providerId="ADAL" clId="{BEC42C30-1405-4B48-B756-209F5AB0C858}" dt="2024-09-14T01:41:26.800" v="92" actId="20577"/>
           <ac:cxnSpMkLst>
             <pc:docMk/>
             <pc:sldMk cId="4030571443" sldId="258"/>
@@ -267,7 +266,7 @@
           </ac:cxnSpMkLst>
         </pc:cxnChg>
         <pc:cxnChg chg="mod">
-          <ac:chgData name="Chenyue Han" userId="494f182c-4a72-4c0d-80c8-f426388df5bd" providerId="ADAL" clId="{BEC42C30-1405-4B48-B756-209F5AB0C858}" dt="2024-09-10T03:20:03.830" v="32" actId="1076"/>
+          <ac:chgData name="Chenyue Han" userId="494f182c-4a72-4c0d-80c8-f426388df5bd" providerId="ADAL" clId="{BEC42C30-1405-4B48-B756-209F5AB0C858}" dt="2024-09-14T01:41:26.800" v="92" actId="20577"/>
           <ac:cxnSpMkLst>
             <pc:docMk/>
             <pc:sldMk cId="4030571443" sldId="258"/>
@@ -307,7 +306,7 @@
           </ac:cxnSpMkLst>
         </pc:cxnChg>
         <pc:cxnChg chg="mod">
-          <ac:chgData name="Chenyue Han" userId="494f182c-4a72-4c0d-80c8-f426388df5bd" providerId="ADAL" clId="{BEC42C30-1405-4B48-B756-209F5AB0C858}" dt="2024-09-10T03:20:03.830" v="32" actId="1076"/>
+          <ac:chgData name="Chenyue Han" userId="494f182c-4a72-4c0d-80c8-f426388df5bd" providerId="ADAL" clId="{BEC42C30-1405-4B48-B756-209F5AB0C858}" dt="2024-09-14T01:41:26.800" v="92" actId="20577"/>
           <ac:cxnSpMkLst>
             <pc:docMk/>
             <pc:sldMk cId="4030571443" sldId="258"/>
@@ -509,7 +508,7 @@
           <a:p>
             <a:fld id="{62C805CD-F19C-435C-AB19-D5D19362D836}" type="datetimeFigureOut">
               <a:rPr lang="en-GB" smtClean="0"/>
-              <a:t>10/09/2024</a:t>
+              <a:t>14/09/2024</a:t>
             </a:fld>
             <a:endParaRPr lang="en-GB"/>
           </a:p>
@@ -709,7 +708,7 @@
           <a:p>
             <a:fld id="{62C805CD-F19C-435C-AB19-D5D19362D836}" type="datetimeFigureOut">
               <a:rPr lang="en-GB" smtClean="0"/>
-              <a:t>10/09/2024</a:t>
+              <a:t>14/09/2024</a:t>
             </a:fld>
             <a:endParaRPr lang="en-GB"/>
           </a:p>
@@ -919,7 +918,7 @@
           <a:p>
             <a:fld id="{62C805CD-F19C-435C-AB19-D5D19362D836}" type="datetimeFigureOut">
               <a:rPr lang="en-GB" smtClean="0"/>
-              <a:t>10/09/2024</a:t>
+              <a:t>14/09/2024</a:t>
             </a:fld>
             <a:endParaRPr lang="en-GB"/>
           </a:p>
@@ -1119,7 +1118,7 @@
           <a:p>
             <a:fld id="{62C805CD-F19C-435C-AB19-D5D19362D836}" type="datetimeFigureOut">
               <a:rPr lang="en-GB" smtClean="0"/>
-              <a:t>10/09/2024</a:t>
+              <a:t>14/09/2024</a:t>
             </a:fld>
             <a:endParaRPr lang="en-GB"/>
           </a:p>
@@ -1395,7 +1394,7 @@
           <a:p>
             <a:fld id="{62C805CD-F19C-435C-AB19-D5D19362D836}" type="datetimeFigureOut">
               <a:rPr lang="en-GB" smtClean="0"/>
-              <a:t>10/09/2024</a:t>
+              <a:t>14/09/2024</a:t>
             </a:fld>
             <a:endParaRPr lang="en-GB"/>
           </a:p>
@@ -1663,7 +1662,7 @@
           <a:p>
             <a:fld id="{62C805CD-F19C-435C-AB19-D5D19362D836}" type="datetimeFigureOut">
               <a:rPr lang="en-GB" smtClean="0"/>
-              <a:t>10/09/2024</a:t>
+              <a:t>14/09/2024</a:t>
             </a:fld>
             <a:endParaRPr lang="en-GB"/>
           </a:p>
@@ -2078,7 +2077,7 @@
           <a:p>
             <a:fld id="{62C805CD-F19C-435C-AB19-D5D19362D836}" type="datetimeFigureOut">
               <a:rPr lang="en-GB" smtClean="0"/>
-              <a:t>10/09/2024</a:t>
+              <a:t>14/09/2024</a:t>
             </a:fld>
             <a:endParaRPr lang="en-GB"/>
           </a:p>
@@ -2220,7 +2219,7 @@
           <a:p>
             <a:fld id="{62C805CD-F19C-435C-AB19-D5D19362D836}" type="datetimeFigureOut">
               <a:rPr lang="en-GB" smtClean="0"/>
-              <a:t>10/09/2024</a:t>
+              <a:t>14/09/2024</a:t>
             </a:fld>
             <a:endParaRPr lang="en-GB"/>
           </a:p>
@@ -2333,7 +2332,7 @@
           <a:p>
             <a:fld id="{62C805CD-F19C-435C-AB19-D5D19362D836}" type="datetimeFigureOut">
               <a:rPr lang="en-GB" smtClean="0"/>
-              <a:t>10/09/2024</a:t>
+              <a:t>14/09/2024</a:t>
             </a:fld>
             <a:endParaRPr lang="en-GB"/>
           </a:p>
@@ -2646,7 +2645,7 @@
           <a:p>
             <a:fld id="{62C805CD-F19C-435C-AB19-D5D19362D836}" type="datetimeFigureOut">
               <a:rPr lang="en-GB" smtClean="0"/>
-              <a:t>10/09/2024</a:t>
+              <a:t>14/09/2024</a:t>
             </a:fld>
             <a:endParaRPr lang="en-GB"/>
           </a:p>
@@ -2935,7 +2934,7 @@
           <a:p>
             <a:fld id="{62C805CD-F19C-435C-AB19-D5D19362D836}" type="datetimeFigureOut">
               <a:rPr lang="en-GB" smtClean="0"/>
-              <a:t>10/09/2024</a:t>
+              <a:t>14/09/2024</a:t>
             </a:fld>
             <a:endParaRPr lang="en-GB"/>
           </a:p>
@@ -3178,7 +3177,7 @@
           <a:p>
             <a:fld id="{62C805CD-F19C-435C-AB19-D5D19362D836}" type="datetimeFigureOut">
               <a:rPr lang="en-GB" smtClean="0"/>
-              <a:t>10/09/2024</a:t>
+              <a:t>14/09/2024</a:t>
             </a:fld>
             <a:endParaRPr lang="en-GB"/>
           </a:p>
@@ -7222,8 +7221,8 @@
         </p:nvSpPr>
         <p:spPr>
           <a:xfrm>
-            <a:off x="382785" y="2700013"/>
-            <a:ext cx="930796" cy="1600438"/>
+            <a:off x="273372" y="2700013"/>
+            <a:ext cx="1040209" cy="2677656"/>
           </a:xfrm>
           <a:prstGeom prst="rect">
             <a:avLst/>
@@ -7259,12 +7258,26 @@
           <a:p>
             <a:pPr algn="ctr"/>
             <a:r>
-              <a:rPr lang="en-GB" sz="1400"/>
-              <a:t>Patients received high-cost </a:t>
-            </a:r>
-            <a:r>
               <a:rPr lang="en-GB" sz="1400" dirty="0"/>
-              <a:t>drug treatments</a:t>
+              <a:t>patients received high-cost drug treatments</a:t>
+            </a:r>
+          </a:p>
+          <a:p>
+            <a:pPr algn="ctr"/>
+            <a:endParaRPr lang="en-GB" sz="1400" dirty="0"/>
+          </a:p>
+          <a:p>
+            <a:pPr algn="ctr"/>
+            <a:r>
+              <a:rPr lang="en-GB" sz="1400" dirty="0">
+                <a:solidFill>
+                  <a:schemeClr val="tx1">
+                    <a:lumMod val="50000"/>
+                    <a:lumOff val="50000"/>
+                  </a:schemeClr>
+                </a:solidFill>
+              </a:rPr>
+              <a:t>(Out of 1235 patients in the dataset)</a:t>
             </a:r>
           </a:p>
         </p:txBody>
@@ -7338,7 +7351,7 @@
         <p:spPr>
           <a:xfrm flipV="1">
             <a:off x="1313581" y="1920158"/>
-            <a:ext cx="928906" cy="1580074"/>
+            <a:ext cx="928906" cy="2118683"/>
           </a:xfrm>
           <a:prstGeom prst="curvedConnector3">
             <a:avLst>
@@ -7482,8 +7495,8 @@
         </p:nvCxnSpPr>
         <p:spPr>
           <a:xfrm>
-            <a:off x="1313581" y="3500232"/>
-            <a:ext cx="928904" cy="2541585"/>
+            <a:off x="1313581" y="4038841"/>
+            <a:ext cx="928904" cy="2002976"/>
           </a:xfrm>
           <a:prstGeom prst="curvedConnector3">
             <a:avLst>
@@ -7887,14 +7900,15 @@
             </a:extLst>
           </p:cNvPr>
           <p:cNvCxnSpPr>
+            <a:cxnSpLocks/>
             <a:stCxn id="4" idx="3"/>
           </p:cNvCxnSpPr>
           <p:nvPr/>
         </p:nvCxnSpPr>
         <p:spPr>
           <a:xfrm>
-            <a:off x="1313581" y="3500232"/>
-            <a:ext cx="928905" cy="778906"/>
+            <a:off x="1313581" y="4038841"/>
+            <a:ext cx="928905" cy="240297"/>
           </a:xfrm>
           <a:prstGeom prst="curvedConnector3">
             <a:avLst>
@@ -8725,7 +8739,7 @@
           <a:p>
             <a:pPr algn="ctr"/>
             <a:r>
-              <a:rPr lang="en-GB" b="1" u="sng">
+              <a:rPr lang="en-GB" b="1" u="sng" dirty="0">
                 <a:solidFill>
                   <a:schemeClr val="accent5"/>
                 </a:solidFill>
@@ -8749,7 +8763,23 @@
                   <a:schemeClr val="accent5"/>
                 </a:solidFill>
               </a:rPr>
-              <a:t>Further differentiation into multiple drugs which will further reduce the sample size of each grouping. </a:t>
+              <a:t>Further differentiation into multiple drugs which </a:t>
+            </a:r>
+            <a:r>
+              <a:rPr lang="en-GB">
+                <a:solidFill>
+                  <a:schemeClr val="accent5"/>
+                </a:solidFill>
+              </a:rPr>
+              <a:t>will reduce </a:t>
+            </a:r>
+            <a:r>
+              <a:rPr lang="en-GB" dirty="0">
+                <a:solidFill>
+                  <a:schemeClr val="accent5"/>
+                </a:solidFill>
+              </a:rPr>
+              <a:t>the sample size of each grouping. </a:t>
             </a:r>
           </a:p>
         </p:txBody>

</xml_diff>